<commit_message>
Updated after Python for engineers
</commit_message>
<xml_diff>
--- a/python_engineers/part_3/python_data_engineers_3.pptx
+++ b/python_engineers/part_3/python_data_engineers_3.pptx
@@ -8707,7 +8707,7 @@
           <p:nvPr>
             <p:extLst>
               <p:ext uri="{D42A27DB-BD31-4B8C-83A1-F6EECF244321}">
-                <p14:modId xmlns:p14="http://schemas.microsoft.com/office/powerpoint/2010/main" val="2430828025"/>
+                <p14:modId xmlns:p14="http://schemas.microsoft.com/office/powerpoint/2010/main" val="1215566912"/>
               </p:ext>
             </p:extLst>
           </p:nvPr>
@@ -8828,30 +8828,30 @@
                     <a:lstStyle/>
                     <a:p>
                       <a:r>
-                        <a:rPr lang="en-US" dirty="0" err="1"/>
+                        <a:rPr lang="en-US" b="0" dirty="0" err="1"/>
                         <a:t>Enkele</a:t>
                       </a:r>
                       <a:r>
-                        <a:rPr lang="en-US" dirty="0"/>
+                        <a:rPr lang="en-US" b="0" dirty="0"/>
                         <a:t> </a:t>
                       </a:r>
                       <a:r>
-                        <a:rPr lang="en-US" dirty="0" err="1"/>
+                        <a:rPr lang="en-US" b="0" dirty="0" err="1"/>
                         <a:t>kolom</a:t>
                       </a:r>
                       <a:r>
-                        <a:rPr lang="en-US" dirty="0"/>
+                        <a:rPr lang="en-US" b="0" dirty="0"/>
                         <a:t> </a:t>
                       </a:r>
                       <a:r>
-                        <a:rPr lang="en-US" dirty="0" err="1"/>
+                        <a:rPr lang="en-US" b="0" dirty="0" err="1"/>
                         <a:t>als</a:t>
                       </a:r>
                       <a:r>
-                        <a:rPr lang="en-US" dirty="0"/>
+                        <a:rPr lang="en-US" b="0" dirty="0"/>
                         <a:t> Series.</a:t>
                       </a:r>
-                      <a:endParaRPr lang="en-NL" dirty="0"/>
+                      <a:endParaRPr lang="en-NL" b="0" dirty="0"/>
                     </a:p>
                   </a:txBody>
                   <a:tcPr anchor="ctr"/>
@@ -8937,46 +8937,46 @@
                     <a:lstStyle/>
                     <a:p>
                       <a:r>
-                        <a:rPr lang="en-US" dirty="0" err="1"/>
+                        <a:rPr lang="en-US" b="0" dirty="0" err="1"/>
                         <a:t>Een</a:t>
                       </a:r>
                       <a:r>
-                        <a:rPr lang="en-US" dirty="0"/>
+                        <a:rPr lang="en-US" b="0" dirty="0"/>
                         <a:t> of </a:t>
                       </a:r>
                       <a:r>
-                        <a:rPr lang="en-US" dirty="0" err="1"/>
+                        <a:rPr lang="en-US" b="0" dirty="0" err="1"/>
                         <a:t>meer</a:t>
                       </a:r>
                       <a:r>
-                        <a:rPr lang="en-US" dirty="0"/>
+                        <a:rPr lang="en-US" b="0" dirty="0"/>
                         <a:t> </a:t>
                       </a:r>
                       <a:r>
-                        <a:rPr lang="en-US" dirty="0" err="1"/>
+                        <a:rPr lang="en-US" b="0" dirty="0" err="1"/>
                         <a:t>kolomen</a:t>
                       </a:r>
                       <a:r>
-                        <a:rPr lang="en-US" dirty="0"/>
+                        <a:rPr lang="en-US" b="0" dirty="0"/>
                         <a:t> </a:t>
                       </a:r>
                       <a:r>
-                        <a:rPr lang="en-US" dirty="0" err="1"/>
+                        <a:rPr lang="en-US" b="0" dirty="0" err="1"/>
                         <a:t>als</a:t>
                       </a:r>
                       <a:r>
-                        <a:rPr lang="en-US" dirty="0"/>
+                        <a:rPr lang="en-US" b="0" dirty="0"/>
                         <a:t> </a:t>
                       </a:r>
                       <a:r>
-                        <a:rPr lang="en-US" dirty="0" err="1"/>
+                        <a:rPr lang="en-US" b="0" dirty="0" err="1"/>
                         <a:t>DataFrame</a:t>
                       </a:r>
                       <a:r>
-                        <a:rPr lang="en-US" dirty="0"/>
+                        <a:rPr lang="en-US" b="0" dirty="0"/>
                         <a:t>.</a:t>
                       </a:r>
-                      <a:endParaRPr lang="en-NL" dirty="0"/>
+                      <a:endParaRPr lang="en-NL" b="0" dirty="0"/>
                     </a:p>
                   </a:txBody>
                   <a:tcPr anchor="ctr"/>
@@ -9076,38 +9076,38 @@
                     <a:lstStyle/>
                     <a:p>
                       <a:r>
-                        <a:rPr lang="en-US" dirty="0" err="1"/>
+                        <a:rPr lang="en-US" b="0" dirty="0" err="1"/>
                         <a:t>Aantal</a:t>
                       </a:r>
                       <a:r>
-                        <a:rPr lang="en-US" dirty="0"/>
+                        <a:rPr lang="en-US" b="0" dirty="0"/>
                         <a:t> </a:t>
                       </a:r>
                       <a:r>
-                        <a:rPr lang="en-US" dirty="0" err="1"/>
+                        <a:rPr lang="en-US" b="0" dirty="0" err="1"/>
                         <a:t>rijen</a:t>
                       </a:r>
                       <a:r>
-                        <a:rPr lang="en-US" dirty="0"/>
+                        <a:rPr lang="en-US" b="0" dirty="0"/>
                         <a:t> </a:t>
                       </a:r>
                       <a:r>
-                        <a:rPr lang="en-US" dirty="0" err="1"/>
+                        <a:rPr lang="en-US" b="0" dirty="0" err="1"/>
                         <a:t>als</a:t>
                       </a:r>
                       <a:r>
-                        <a:rPr lang="en-US" dirty="0"/>
+                        <a:rPr lang="en-US" b="0" dirty="0"/>
                         <a:t> </a:t>
                       </a:r>
                       <a:r>
-                        <a:rPr lang="en-US" dirty="0" err="1"/>
+                        <a:rPr lang="en-US" b="0" dirty="0" err="1"/>
                         <a:t>DataFrame</a:t>
                       </a:r>
                       <a:r>
-                        <a:rPr lang="en-US" dirty="0"/>
+                        <a:rPr lang="en-US" b="0" dirty="0"/>
                         <a:t>.</a:t>
                       </a:r>
-                      <a:endParaRPr lang="en-NL" dirty="0"/>
+                      <a:endParaRPr lang="en-NL" b="0" dirty="0"/>
                     </a:p>
                   </a:txBody>
                   <a:tcPr anchor="ctr"/>
@@ -9227,46 +9227,46 @@
                     <a:lstStyle/>
                     <a:p>
                       <a:r>
-                        <a:rPr lang="en-US" dirty="0" err="1"/>
+                        <a:rPr lang="en-US" b="0" dirty="0" err="1"/>
                         <a:t>Aantal</a:t>
                       </a:r>
                       <a:r>
-                        <a:rPr lang="en-US" dirty="0"/>
+                        <a:rPr lang="en-US" b="0" dirty="0"/>
                         <a:t> </a:t>
                       </a:r>
                       <a:r>
-                        <a:rPr lang="en-US" dirty="0" err="1"/>
+                        <a:rPr lang="en-US" b="0" dirty="0" err="1"/>
                         <a:t>rijen</a:t>
                       </a:r>
                       <a:r>
-                        <a:rPr lang="en-US" dirty="0"/>
+                        <a:rPr lang="en-US" b="0" dirty="0"/>
                         <a:t> </a:t>
                       </a:r>
                       <a:r>
-                        <a:rPr lang="en-US" dirty="0" err="1"/>
+                        <a:rPr lang="en-US" b="0" dirty="0" err="1"/>
                         <a:t>en</a:t>
                       </a:r>
                       <a:r>
-                        <a:rPr lang="en-US" dirty="0"/>
+                        <a:rPr lang="en-US" b="0" dirty="0"/>
                         <a:t> </a:t>
                       </a:r>
                       <a:r>
-                        <a:rPr lang="en-US" dirty="0" err="1"/>
+                        <a:rPr lang="en-US" b="0" dirty="0" err="1"/>
                         <a:t>kolommen</a:t>
                       </a:r>
                       <a:r>
-                        <a:rPr lang="en-US" dirty="0"/>
+                        <a:rPr lang="en-US" b="0" dirty="0"/>
                         <a:t>, </a:t>
                       </a:r>
                       <a:r>
-                        <a:rPr lang="en-US" dirty="0" err="1"/>
+                        <a:rPr lang="en-US" b="0" dirty="0" err="1"/>
                         <a:t>geselecteerd</a:t>
                       </a:r>
                       <a:r>
-                        <a:rPr lang="en-US" dirty="0"/>
+                        <a:rPr lang="en-US" b="0" dirty="0"/>
                         <a:t> met labels.</a:t>
                       </a:r>
-                      <a:endParaRPr lang="en-NL" dirty="0"/>
+                      <a:endParaRPr lang="en-NL" b="0" dirty="0"/>
                     </a:p>
                   </a:txBody>
                   <a:tcPr anchor="ctr"/>
@@ -9419,54 +9419,54 @@
                         <a:defRPr/>
                       </a:pPr>
                       <a:r>
-                        <a:rPr lang="en-US" dirty="0" err="1"/>
+                        <a:rPr lang="en-US" b="0" dirty="0" err="1"/>
                         <a:t>Aantal</a:t>
                       </a:r>
                       <a:r>
-                        <a:rPr lang="en-US" dirty="0"/>
+                        <a:rPr lang="en-US" b="0" dirty="0"/>
                         <a:t> </a:t>
                       </a:r>
                       <a:r>
-                        <a:rPr lang="en-US" dirty="0" err="1"/>
+                        <a:rPr lang="en-US" b="0" dirty="0" err="1"/>
                         <a:t>rijen</a:t>
                       </a:r>
                       <a:r>
-                        <a:rPr lang="en-US" dirty="0"/>
+                        <a:rPr lang="en-US" b="0" dirty="0"/>
                         <a:t> </a:t>
                       </a:r>
                       <a:r>
-                        <a:rPr lang="en-US" dirty="0" err="1"/>
+                        <a:rPr lang="en-US" b="0" dirty="0" err="1"/>
                         <a:t>en</a:t>
                       </a:r>
                       <a:r>
-                        <a:rPr lang="en-US" dirty="0"/>
+                        <a:rPr lang="en-US" b="0" dirty="0"/>
                         <a:t> </a:t>
                       </a:r>
                       <a:r>
-                        <a:rPr lang="en-US" dirty="0" err="1"/>
+                        <a:rPr lang="en-US" b="0" dirty="0" err="1"/>
                         <a:t>kolommen</a:t>
                       </a:r>
                       <a:r>
-                        <a:rPr lang="en-US" dirty="0"/>
+                        <a:rPr lang="en-US" b="0" dirty="0"/>
                         <a:t>, </a:t>
                       </a:r>
                       <a:r>
-                        <a:rPr lang="en-US" dirty="0" err="1"/>
+                        <a:rPr lang="en-US" b="0" dirty="0" err="1"/>
                         <a:t>geselecteerd</a:t>
                       </a:r>
                       <a:r>
-                        <a:rPr lang="en-US" dirty="0"/>
+                        <a:rPr lang="en-US" b="0" dirty="0"/>
                         <a:t> op </a:t>
                       </a:r>
                       <a:r>
-                        <a:rPr lang="en-US" dirty="0" err="1"/>
+                        <a:rPr lang="en-US" b="0" dirty="0" err="1"/>
                         <a:t>positie</a:t>
                       </a:r>
                       <a:r>
-                        <a:rPr lang="en-US" dirty="0"/>
+                        <a:rPr lang="en-US" b="0" dirty="0"/>
                         <a:t>.</a:t>
                       </a:r>
-                      <a:endParaRPr lang="en-NL" dirty="0"/>
+                      <a:endParaRPr lang="en-NL" b="0" dirty="0"/>
                     </a:p>
                   </a:txBody>
                   <a:tcPr anchor="ctr"/>

</xml_diff>